<commit_message>
added unit test documentation
</commit_message>
<xml_diff>
--- a/Diagram/AngularJs + ASP.pptx
+++ b/Diagram/AngularJs + ASP.pptx
@@ -544,6 +544,333 @@
     <p:extLst>
       <p:ext uri="{BB962C8B-B14F-4D97-AF65-F5344CB8AC3E}">
         <p14:creationId xmlns:p14="http://schemas.microsoft.com/office/powerpoint/2010/main" val="2119671623"/>
+      </p:ext>
+    </p:extLst>
+  </p:cSld>
+  <p:clrMapOvr>
+    <a:masterClrMapping/>
+  </p:clrMapOvr>
+</p:notes>
+</file>
+
+<file path=ppt/notesSlides/notesSlide2.xml><?xml version="1.0" encoding="utf-8"?>
+<p:notes xmlns:a="http://schemas.openxmlformats.org/drawingml/2006/main" xmlns:r="http://schemas.openxmlformats.org/officeDocument/2006/relationships" xmlns:p="http://schemas.openxmlformats.org/presentationml/2006/main">
+  <p:cSld>
+    <p:spTree>
+      <p:nvGrpSpPr>
+        <p:cNvPr id="1" name=""/>
+        <p:cNvGrpSpPr/>
+        <p:nvPr/>
+      </p:nvGrpSpPr>
+      <p:grpSpPr>
+        <a:xfrm>
+          <a:off x="0" y="0"/>
+          <a:ext cx="0" cy="0"/>
+          <a:chOff x="0" y="0"/>
+          <a:chExt cx="0" cy="0"/>
+        </a:xfrm>
+      </p:grpSpPr>
+      <p:sp>
+        <p:nvSpPr>
+          <p:cNvPr id="2" name="Slide Image Placeholder 1"/>
+          <p:cNvSpPr>
+            <a:spLocks noGrp="1" noRot="1" noChangeAspect="1"/>
+          </p:cNvSpPr>
+          <p:nvPr>
+            <p:ph type="sldImg"/>
+          </p:nvPr>
+        </p:nvSpPr>
+        <p:spPr/>
+      </p:sp>
+      <p:sp>
+        <p:nvSpPr>
+          <p:cNvPr id="3" name="Notes Placeholder 2"/>
+          <p:cNvSpPr>
+            <a:spLocks noGrp="1"/>
+          </p:cNvSpPr>
+          <p:nvPr>
+            <p:ph type="body" idx="1"/>
+          </p:nvPr>
+        </p:nvSpPr>
+        <p:spPr/>
+        <p:txBody>
+          <a:bodyPr/>
+          <a:lstStyle/>
+          <a:p>
+            <a:r>
+              <a:rPr lang="en-US" dirty="0" err="1" smtClean="0"/>
+              <a:t>Javascript</a:t>
+            </a:r>
+            <a:r>
+              <a:rPr lang="en-US" baseline="0" dirty="0" smtClean="0"/>
+              <a:t> unit tests</a:t>
+            </a:r>
+          </a:p>
+          <a:p>
+            <a:pPr marL="0" indent="0">
+              <a:buFont typeface="Arial" panose="020B0604020202020204" pitchFamily="34" charset="0"/>
+              <a:buNone/>
+            </a:pPr>
+            <a:r>
+              <a:rPr lang="en-US" baseline="0" dirty="0" smtClean="0"/>
+              <a:t>Test Runner - Chutzpah</a:t>
+            </a:r>
+          </a:p>
+          <a:p>
+            <a:pPr marL="0" indent="0">
+              <a:buFont typeface="Arial" panose="020B0604020202020204" pitchFamily="34" charset="0"/>
+              <a:buNone/>
+            </a:pPr>
+            <a:r>
+              <a:rPr lang="en-US" baseline="0" dirty="0" smtClean="0"/>
+              <a:t>Install Vs extensions </a:t>
+            </a:r>
+          </a:p>
+          <a:p>
+            <a:pPr marL="628650" lvl="1" indent="-171450">
+              <a:buFont typeface="Arial" panose="020B0604020202020204" pitchFamily="34" charset="0"/>
+              <a:buChar char="•"/>
+            </a:pPr>
+            <a:r>
+              <a:rPr lang="en-US" baseline="0" dirty="0" smtClean="0"/>
+              <a:t>Chutzpah Test Adapter for the Test Explorer</a:t>
+            </a:r>
+          </a:p>
+          <a:p>
+            <a:pPr marL="628650" marR="0" lvl="2" indent="-171450" algn="l" defTabSz="914400" rtl="0" eaLnBrk="1" fontAlgn="auto" latinLnBrk="0" hangingPunct="1">
+              <a:lnSpc>
+                <a:spcPct val="100000"/>
+              </a:lnSpc>
+              <a:spcBef>
+                <a:spcPts val="0"/>
+              </a:spcBef>
+              <a:spcAft>
+                <a:spcPts val="0"/>
+              </a:spcAft>
+              <a:buClrTx/>
+              <a:buSzTx/>
+              <a:buFont typeface="Arial" panose="020B0604020202020204" pitchFamily="34" charset="0"/>
+              <a:buChar char="•"/>
+              <a:tabLst/>
+              <a:defRPr/>
+            </a:pPr>
+            <a:r>
+              <a:rPr lang="en-US" baseline="0" dirty="0" smtClean="0"/>
+              <a:t>Chutzpah Test Runner Context Menu Extension</a:t>
+            </a:r>
+          </a:p>
+          <a:p>
+            <a:pPr marL="628650" marR="0" lvl="2" indent="-171450" algn="l" defTabSz="914400" rtl="0" eaLnBrk="1" fontAlgn="auto" latinLnBrk="0" hangingPunct="1">
+              <a:lnSpc>
+                <a:spcPct val="100000"/>
+              </a:lnSpc>
+              <a:spcBef>
+                <a:spcPts val="0"/>
+              </a:spcBef>
+              <a:spcAft>
+                <a:spcPts val="0"/>
+              </a:spcAft>
+              <a:buClrTx/>
+              <a:buSzTx/>
+              <a:buFont typeface="Arial" panose="020B0604020202020204" pitchFamily="34" charset="0"/>
+              <a:buChar char="•"/>
+              <a:tabLst/>
+              <a:defRPr/>
+            </a:pPr>
+            <a:endParaRPr lang="en-US" baseline="0" dirty="0" smtClean="0"/>
+          </a:p>
+          <a:p>
+            <a:pPr marL="0" marR="0" lvl="0" indent="0" algn="l" defTabSz="914400" rtl="0" eaLnBrk="1" fontAlgn="auto" latinLnBrk="0" hangingPunct="1">
+              <a:lnSpc>
+                <a:spcPct val="100000"/>
+              </a:lnSpc>
+              <a:spcBef>
+                <a:spcPts val="0"/>
+              </a:spcBef>
+              <a:spcAft>
+                <a:spcPts val="0"/>
+              </a:spcAft>
+              <a:buClrTx/>
+              <a:buSzTx/>
+              <a:buFont typeface="Arial" panose="020B0604020202020204" pitchFamily="34" charset="0"/>
+              <a:buNone/>
+              <a:tabLst/>
+              <a:defRPr/>
+            </a:pPr>
+            <a:r>
+              <a:rPr lang="en-US" baseline="0" dirty="0" smtClean="0"/>
+              <a:t>Test Runner – </a:t>
+            </a:r>
+            <a:r>
+              <a:rPr lang="en-US" baseline="0" dirty="0" err="1" smtClean="0"/>
+              <a:t>Resharper</a:t>
+            </a:r>
+            <a:endParaRPr lang="en-US" baseline="0" dirty="0" smtClean="0"/>
+          </a:p>
+          <a:p>
+            <a:pPr marL="0" marR="0" lvl="0" indent="0" algn="l" defTabSz="914400" rtl="0" eaLnBrk="1" fontAlgn="auto" latinLnBrk="0" hangingPunct="1">
+              <a:lnSpc>
+                <a:spcPct val="100000"/>
+              </a:lnSpc>
+              <a:spcBef>
+                <a:spcPts val="0"/>
+              </a:spcBef>
+              <a:spcAft>
+                <a:spcPts val="0"/>
+              </a:spcAft>
+              <a:buClrTx/>
+              <a:buSzTx/>
+              <a:buFont typeface="Arial" panose="020B0604020202020204" pitchFamily="34" charset="0"/>
+              <a:buNone/>
+              <a:tabLst/>
+              <a:defRPr/>
+            </a:pPr>
+            <a:r>
+              <a:rPr lang="en-US" baseline="0" dirty="0" err="1" smtClean="0"/>
+              <a:t>Resharper</a:t>
+            </a:r>
+            <a:r>
+              <a:rPr lang="en-US" baseline="0" dirty="0" smtClean="0"/>
+              <a:t> &gt; Options &gt; Tools &gt; Unit Testing &gt; </a:t>
+            </a:r>
+            <a:r>
+              <a:rPr lang="en-US" baseline="0" dirty="0" err="1" smtClean="0"/>
+              <a:t>Javascript</a:t>
+            </a:r>
+            <a:r>
+              <a:rPr lang="en-US" baseline="0" dirty="0" smtClean="0"/>
+              <a:t> Tests</a:t>
+            </a:r>
+          </a:p>
+          <a:p>
+            <a:pPr marL="171450" marR="0" lvl="0" indent="-171450" algn="l" defTabSz="914400" rtl="0" eaLnBrk="1" fontAlgn="auto" latinLnBrk="0" hangingPunct="1">
+              <a:lnSpc>
+                <a:spcPct val="100000"/>
+              </a:lnSpc>
+              <a:spcBef>
+                <a:spcPts val="0"/>
+              </a:spcBef>
+              <a:spcAft>
+                <a:spcPts val="0"/>
+              </a:spcAft>
+              <a:buClrTx/>
+              <a:buSzTx/>
+              <a:buFont typeface="Arial" panose="020B0604020202020204" pitchFamily="34" charset="0"/>
+              <a:buChar char="•"/>
+              <a:tabLst/>
+              <a:defRPr/>
+            </a:pPr>
+            <a:r>
+              <a:rPr lang="en-US" baseline="0" dirty="0" smtClean="0"/>
+              <a:t>Verify Jasmine Support is enabled</a:t>
+            </a:r>
+          </a:p>
+          <a:p>
+            <a:pPr marL="171450" marR="0" lvl="0" indent="-171450" algn="l" defTabSz="914400" rtl="0" eaLnBrk="1" fontAlgn="auto" latinLnBrk="0" hangingPunct="1">
+              <a:lnSpc>
+                <a:spcPct val="100000"/>
+              </a:lnSpc>
+              <a:spcBef>
+                <a:spcPts val="0"/>
+              </a:spcBef>
+              <a:spcAft>
+                <a:spcPts val="0"/>
+              </a:spcAft>
+              <a:buClrTx/>
+              <a:buSzTx/>
+              <a:buFont typeface="Arial" panose="020B0604020202020204" pitchFamily="34" charset="0"/>
+              <a:buChar char="•"/>
+              <a:tabLst/>
+              <a:defRPr/>
+            </a:pPr>
+            <a:r>
+              <a:rPr lang="en-US" baseline="0" dirty="0" smtClean="0"/>
+              <a:t>Verify Jasmine Version – 2.0</a:t>
+            </a:r>
+          </a:p>
+          <a:p>
+            <a:pPr marL="171450" marR="0" lvl="0" indent="-171450" algn="l" defTabSz="914400" rtl="0" eaLnBrk="1" fontAlgn="auto" latinLnBrk="0" hangingPunct="1">
+              <a:lnSpc>
+                <a:spcPct val="100000"/>
+              </a:lnSpc>
+              <a:spcBef>
+                <a:spcPts val="0"/>
+              </a:spcBef>
+              <a:spcAft>
+                <a:spcPts val="0"/>
+              </a:spcAft>
+              <a:buClrTx/>
+              <a:buSzTx/>
+              <a:buFont typeface="Arial" panose="020B0604020202020204" pitchFamily="34" charset="0"/>
+              <a:buChar char="•"/>
+              <a:tabLst/>
+              <a:defRPr/>
+            </a:pPr>
+            <a:r>
+              <a:rPr lang="en-US" baseline="0" dirty="0" smtClean="0"/>
+              <a:t>Run Tests with </a:t>
+            </a:r>
+            <a:r>
+              <a:rPr lang="en-US" baseline="0" dirty="0" err="1" smtClean="0"/>
+              <a:t>PhantomJS</a:t>
+            </a:r>
+            <a:r>
+              <a:rPr lang="en-US" baseline="0" dirty="0" smtClean="0"/>
+              <a:t> – set the executable path (install </a:t>
+            </a:r>
+            <a:r>
+              <a:rPr lang="en-US" baseline="0" dirty="0" err="1" smtClean="0"/>
+              <a:t>phantomJs</a:t>
+            </a:r>
+            <a:r>
+              <a:rPr lang="en-US" baseline="0" smtClean="0"/>
+              <a:t>)</a:t>
+            </a:r>
+            <a:endParaRPr lang="en-US" baseline="0" dirty="0" smtClean="0"/>
+          </a:p>
+          <a:p>
+            <a:pPr marL="171450" indent="-171450">
+              <a:buFont typeface="Arial" panose="020B0604020202020204" pitchFamily="34" charset="0"/>
+              <a:buChar char="•"/>
+            </a:pPr>
+            <a:endParaRPr lang="en-US" baseline="0" dirty="0" smtClean="0"/>
+          </a:p>
+          <a:p>
+            <a:pPr marL="171450" indent="-171450">
+              <a:buFont typeface="Arial" panose="020B0604020202020204" pitchFamily="34" charset="0"/>
+              <a:buChar char="•"/>
+            </a:pPr>
+            <a:endParaRPr lang="en-US" dirty="0"/>
+          </a:p>
+        </p:txBody>
+      </p:sp>
+      <p:sp>
+        <p:nvSpPr>
+          <p:cNvPr id="4" name="Slide Number Placeholder 3"/>
+          <p:cNvSpPr>
+            <a:spLocks noGrp="1"/>
+          </p:cNvSpPr>
+          <p:nvPr>
+            <p:ph type="sldNum" sz="quarter" idx="10"/>
+          </p:nvPr>
+        </p:nvSpPr>
+        <p:spPr/>
+        <p:txBody>
+          <a:bodyPr/>
+          <a:lstStyle/>
+          <a:p>
+            <a:fld id="{4211A5BA-3223-4F89-AE1C-B333D049FC94}" type="slidenum">
+              <a:rPr lang="en-US" smtClean="0"/>
+              <a:t>4</a:t>
+            </a:fld>
+            <a:endParaRPr lang="en-US"/>
+          </a:p>
+        </p:txBody>
+      </p:sp>
+    </p:spTree>
+    <p:extLst>
+      <p:ext uri="{BB962C8B-B14F-4D97-AF65-F5344CB8AC3E}">
+        <p14:creationId xmlns:p14="http://schemas.microsoft.com/office/powerpoint/2010/main" val="592822113"/>
       </p:ext>
     </p:extLst>
   </p:cSld>
@@ -4033,11 +4360,7 @@
           <a:p>
             <a:r>
               <a:rPr lang="en-US" dirty="0" smtClean="0"/>
-              <a:t>Real-time </a:t>
-            </a:r>
-            <a:r>
-              <a:rPr lang="en-US" dirty="0" smtClean="0"/>
-              <a:t>application using </a:t>
+              <a:t>Real-time application using </a:t>
             </a:r>
             <a:r>
               <a:rPr lang="en-US" dirty="0" err="1" smtClean="0"/>

</xml_diff>